<commit_message>
Working on PP, added acronyms and code appendix
</commit_message>
<xml_diff>
--- a/source/figures/thesis_figures.pptx
+++ b/source/figures/thesis_figures.pptx
@@ -7,6 +7,7 @@
   <p:sldIdLst>
     <p:sldId id="256" r:id="rId2"/>
     <p:sldId id="257" r:id="rId3"/>
+    <p:sldId id="258" r:id="rId4"/>
   </p:sldIdLst>
   <p:sldSz cx="12192000" cy="6858000"/>
   <p:notesSz cx="6858000" cy="9144000"/>
@@ -3474,8 +3475,8 @@
         </p:nvCxnSpPr>
         <p:spPr>
           <a:xfrm flipV="1">
-            <a:off x="3006182" y="4702538"/>
-            <a:ext cx="1425141" cy="283356"/>
+            <a:off x="2957738" y="4673146"/>
+            <a:ext cx="1519719" cy="283356"/>
           </a:xfrm>
           <a:prstGeom prst="straightConnector1">
             <a:avLst/>
@@ -3869,8 +3870,8 @@
         </p:nvSpPr>
         <p:spPr>
           <a:xfrm>
-            <a:off x="772557" y="4755061"/>
-            <a:ext cx="2233625" cy="461665"/>
+            <a:off x="818691" y="4725669"/>
+            <a:ext cx="2139047" cy="461665"/>
           </a:xfrm>
           <a:prstGeom prst="rect">
             <a:avLst/>
@@ -3885,7 +3886,7 @@
           <a:p>
             <a:r>
               <a:rPr lang="en-US" sz="2400" b="1" smtClean="0"/>
-              <a:t>Over-ride speed</a:t>
+              <a:t>Override speed</a:t>
             </a:r>
             <a:endParaRPr lang="en-US" sz="2400" b="1"/>
           </a:p>
@@ -4039,6 +4040,504 @@
     <p:extLst>
       <p:ext uri="{BB962C8B-B14F-4D97-AF65-F5344CB8AC3E}">
         <p14:creationId xmlns:p14="http://schemas.microsoft.com/office/powerpoint/2010/main" val="986133928"/>
+      </p:ext>
+    </p:extLst>
+  </p:cSld>
+  <p:clrMapOvr>
+    <a:masterClrMapping/>
+  </p:clrMapOvr>
+</p:sld>
+</file>
+
+<file path=ppt/slides/slide3.xml><?xml version="1.0" encoding="utf-8"?>
+<p:sld xmlns:a="http://schemas.openxmlformats.org/drawingml/2006/main" xmlns:r="http://schemas.openxmlformats.org/officeDocument/2006/relationships" xmlns:p="http://schemas.openxmlformats.org/presentationml/2006/main">
+  <p:cSld>
+    <p:spTree>
+      <p:nvGrpSpPr>
+        <p:cNvPr id="1" name=""/>
+        <p:cNvGrpSpPr/>
+        <p:nvPr/>
+      </p:nvGrpSpPr>
+      <p:grpSpPr>
+        <a:xfrm>
+          <a:off x="0" y="0"/>
+          <a:ext cx="0" cy="0"/>
+          <a:chOff x="0" y="0"/>
+          <a:chExt cx="0" cy="0"/>
+        </a:xfrm>
+      </p:grpSpPr>
+      <p:sp>
+        <p:nvSpPr>
+          <p:cNvPr id="4" name="Rectangle 3"/>
+          <p:cNvSpPr/>
+          <p:nvPr/>
+        </p:nvSpPr>
+        <p:spPr>
+          <a:xfrm rot="5400000">
+            <a:off x="10584005" y="2788949"/>
+            <a:ext cx="897924" cy="1371600"/>
+          </a:xfrm>
+          <a:prstGeom prst="rect">
+            <a:avLst/>
+          </a:prstGeom>
+          <a:noFill/>
+          <a:ln w="15875" cap="rnd" cmpd="sng" algn="ctr">
+            <a:solidFill>
+              <a:srgbClr val="0070C0"/>
+            </a:solidFill>
+            <a:prstDash val="solid"/>
+          </a:ln>
+          <a:effectLst/>
+        </p:spPr>
+        <p:txBody>
+          <a:bodyPr rtlCol="0" anchor="ctr"/>
+          <a:lstStyle/>
+          <a:p>
+            <a:pPr marL="0" marR="0" lvl="0" indent="0" algn="ctr" defTabSz="914400" eaLnBrk="1" fontAlgn="auto" latinLnBrk="0" hangingPunct="1">
+              <a:lnSpc>
+                <a:spcPct val="100000"/>
+              </a:lnSpc>
+              <a:spcBef>
+                <a:spcPts val="0"/>
+              </a:spcBef>
+              <a:spcAft>
+                <a:spcPts val="0"/>
+              </a:spcAft>
+              <a:buClrTx/>
+              <a:buSzTx/>
+              <a:buFontTx/>
+              <a:buNone/>
+              <a:tabLst/>
+              <a:defRPr/>
+            </a:pPr>
+            <a:endParaRPr kumimoji="0" lang="en-US" sz="1800" b="0" i="0" u="none" strike="noStrike" kern="0" cap="none" spc="0" normalizeH="0" baseline="0" noProof="0" dirty="0">
+              <a:ln>
+                <a:solidFill>
+                  <a:srgbClr val="0070C0"/>
+                </a:solidFill>
+              </a:ln>
+              <a:solidFill>
+                <a:prstClr val="white"/>
+              </a:solidFill>
+              <a:effectLst/>
+              <a:uLnTx/>
+              <a:uFillTx/>
+              <a:latin typeface="Century Gothic" panose="020B0502020202020204"/>
+              <a:ea typeface="+mn-ea"/>
+              <a:cs typeface="+mn-cs"/>
+            </a:endParaRPr>
+          </a:p>
+        </p:txBody>
+      </p:sp>
+      <p:sp>
+        <p:nvSpPr>
+          <p:cNvPr id="5" name="Rectangle 4"/>
+          <p:cNvSpPr/>
+          <p:nvPr/>
+        </p:nvSpPr>
+        <p:spPr>
+          <a:xfrm rot="5400000">
+            <a:off x="10574769" y="4183111"/>
+            <a:ext cx="897924" cy="1371600"/>
+          </a:xfrm>
+          <a:prstGeom prst="rect">
+            <a:avLst/>
+          </a:prstGeom>
+          <a:noFill/>
+          <a:ln w="15875" cap="rnd" cmpd="sng" algn="ctr">
+            <a:solidFill>
+              <a:srgbClr val="0070C0"/>
+            </a:solidFill>
+            <a:prstDash val="solid"/>
+          </a:ln>
+          <a:effectLst/>
+        </p:spPr>
+        <p:txBody>
+          <a:bodyPr rtlCol="0" anchor="ctr"/>
+          <a:lstStyle/>
+          <a:p>
+            <a:pPr marL="0" marR="0" lvl="0" indent="0" algn="ctr" defTabSz="914400" eaLnBrk="1" fontAlgn="auto" latinLnBrk="0" hangingPunct="1">
+              <a:lnSpc>
+                <a:spcPct val="100000"/>
+              </a:lnSpc>
+              <a:spcBef>
+                <a:spcPts val="0"/>
+              </a:spcBef>
+              <a:spcAft>
+                <a:spcPts val="0"/>
+              </a:spcAft>
+              <a:buClrTx/>
+              <a:buSzTx/>
+              <a:buFontTx/>
+              <a:buNone/>
+              <a:tabLst/>
+              <a:defRPr/>
+            </a:pPr>
+            <a:endParaRPr kumimoji="0" lang="en-US" sz="1800" b="0" i="0" u="none" strike="noStrike" kern="0" cap="none" spc="0" normalizeH="0" baseline="0" noProof="0" dirty="0">
+              <a:ln>
+                <a:solidFill>
+                  <a:srgbClr val="0070C0"/>
+                </a:solidFill>
+              </a:ln>
+              <a:solidFill>
+                <a:prstClr val="white"/>
+              </a:solidFill>
+              <a:effectLst/>
+              <a:uLnTx/>
+              <a:uFillTx/>
+              <a:latin typeface="Century Gothic" panose="020B0502020202020204"/>
+              <a:ea typeface="+mn-ea"/>
+              <a:cs typeface="+mn-cs"/>
+            </a:endParaRPr>
+          </a:p>
+        </p:txBody>
+      </p:sp>
+      <p:sp>
+        <p:nvSpPr>
+          <p:cNvPr id="6" name="Rectangle 5"/>
+          <p:cNvSpPr/>
+          <p:nvPr/>
+        </p:nvSpPr>
+        <p:spPr>
+          <a:xfrm rot="5400000">
+            <a:off x="8961209" y="3431745"/>
+            <a:ext cx="1145060" cy="1445056"/>
+          </a:xfrm>
+          <a:prstGeom prst="rect">
+            <a:avLst/>
+          </a:prstGeom>
+          <a:solidFill>
+            <a:srgbClr val="A53010"/>
+          </a:solidFill>
+          <a:ln w="15875" cap="rnd" cmpd="sng" algn="ctr">
+            <a:solidFill>
+              <a:srgbClr val="A53010">
+                <a:shade val="50000"/>
+              </a:srgbClr>
+            </a:solidFill>
+            <a:prstDash val="solid"/>
+          </a:ln>
+          <a:effectLst/>
+        </p:spPr>
+        <p:txBody>
+          <a:bodyPr rtlCol="0" anchor="ctr"/>
+          <a:lstStyle/>
+          <a:p>
+            <a:pPr marL="0" marR="0" lvl="0" indent="0" algn="ctr" defTabSz="914400" eaLnBrk="1" fontAlgn="auto" latinLnBrk="0" hangingPunct="1">
+              <a:lnSpc>
+                <a:spcPct val="100000"/>
+              </a:lnSpc>
+              <a:spcBef>
+                <a:spcPts val="0"/>
+              </a:spcBef>
+              <a:spcAft>
+                <a:spcPts val="0"/>
+              </a:spcAft>
+              <a:buClrTx/>
+              <a:buSzTx/>
+              <a:buFontTx/>
+              <a:buNone/>
+              <a:tabLst/>
+              <a:defRPr/>
+            </a:pPr>
+            <a:r>
+              <a:rPr kumimoji="0" lang="en-US" sz="1800" b="0" i="0" u="none" strike="noStrike" kern="0" cap="none" spc="0" normalizeH="0" baseline="0" noProof="0" dirty="0" smtClean="0">
+                <a:ln>
+                  <a:noFill/>
+                </a:ln>
+                <a:solidFill>
+                  <a:prstClr val="white"/>
+                </a:solidFill>
+                <a:effectLst/>
+                <a:uLnTx/>
+                <a:uFillTx/>
+                <a:latin typeface="Century Gothic" panose="020B0502020202020204"/>
+                <a:ea typeface="+mn-ea"/>
+                <a:cs typeface="+mn-cs"/>
+              </a:rPr>
+              <a:t>Robot</a:t>
+            </a:r>
+            <a:endParaRPr kumimoji="0" lang="en-US" sz="1800" b="0" i="0" u="none" strike="noStrike" kern="0" cap="none" spc="0" normalizeH="0" baseline="0" noProof="0" dirty="0">
+              <a:ln>
+                <a:noFill/>
+              </a:ln>
+              <a:solidFill>
+                <a:prstClr val="white"/>
+              </a:solidFill>
+              <a:effectLst/>
+              <a:uLnTx/>
+              <a:uFillTx/>
+              <a:latin typeface="Century Gothic" panose="020B0502020202020204"/>
+              <a:ea typeface="+mn-ea"/>
+              <a:cs typeface="+mn-cs"/>
+            </a:endParaRPr>
+          </a:p>
+        </p:txBody>
+      </p:sp>
+      <p:sp>
+        <p:nvSpPr>
+          <p:cNvPr id="7" name="TextBox 6"/>
+          <p:cNvSpPr txBox="1"/>
+          <p:nvPr/>
+        </p:nvSpPr>
+        <p:spPr>
+          <a:xfrm>
+            <a:off x="10523043" y="3182361"/>
+            <a:ext cx="1018227" cy="584775"/>
+          </a:xfrm>
+          <a:prstGeom prst="rect">
+            <a:avLst/>
+          </a:prstGeom>
+          <a:noFill/>
+        </p:spPr>
+        <p:txBody>
+          <a:bodyPr wrap="none" rtlCol="0">
+            <a:spAutoFit/>
+          </a:bodyPr>
+          <a:lstStyle/>
+          <a:p>
+            <a:pPr algn="ctr"/>
+            <a:r>
+              <a:rPr lang="en-US" sz="1600">
+                <a:solidFill>
+                  <a:prstClr val="black"/>
+                </a:solidFill>
+                <a:latin typeface="Century Gothic" panose="020B0502020202020204"/>
+              </a:rPr>
+              <a:t>Left </a:t>
+            </a:r>
+          </a:p>
+          <a:p>
+            <a:pPr algn="ctr"/>
+            <a:r>
+              <a:rPr lang="en-US" sz="1600">
+                <a:solidFill>
+                  <a:prstClr val="black"/>
+                </a:solidFill>
+                <a:latin typeface="Century Gothic" panose="020B0502020202020204"/>
+              </a:rPr>
+              <a:t>Camera</a:t>
+            </a:r>
+          </a:p>
+        </p:txBody>
+      </p:sp>
+      <p:sp>
+        <p:nvSpPr>
+          <p:cNvPr id="9" name="TextBox 8"/>
+          <p:cNvSpPr txBox="1"/>
+          <p:nvPr/>
+        </p:nvSpPr>
+        <p:spPr>
+          <a:xfrm>
+            <a:off x="10523044" y="4576523"/>
+            <a:ext cx="1018227" cy="584775"/>
+          </a:xfrm>
+          <a:prstGeom prst="rect">
+            <a:avLst/>
+          </a:prstGeom>
+          <a:noFill/>
+        </p:spPr>
+        <p:txBody>
+          <a:bodyPr wrap="none" rtlCol="0">
+            <a:spAutoFit/>
+          </a:bodyPr>
+          <a:lstStyle/>
+          <a:p>
+            <a:pPr algn="ctr"/>
+            <a:r>
+              <a:rPr lang="en-US" sz="1600">
+                <a:solidFill>
+                  <a:prstClr val="black"/>
+                </a:solidFill>
+                <a:latin typeface="Century Gothic" panose="020B0502020202020204"/>
+              </a:rPr>
+              <a:t>Right</a:t>
+            </a:r>
+          </a:p>
+          <a:p>
+            <a:pPr algn="ctr"/>
+            <a:r>
+              <a:rPr lang="en-US" sz="1600">
+                <a:solidFill>
+                  <a:prstClr val="black"/>
+                </a:solidFill>
+                <a:latin typeface="Century Gothic" panose="020B0502020202020204"/>
+              </a:rPr>
+              <a:t>Camera</a:t>
+            </a:r>
+            <a:endParaRPr lang="en-US" sz="1600" dirty="0">
+              <a:solidFill>
+                <a:prstClr val="black"/>
+              </a:solidFill>
+              <a:latin typeface="Century Gothic" panose="020B0502020202020204"/>
+            </a:endParaRPr>
+          </a:p>
+        </p:txBody>
+      </p:sp>
+      <p:sp>
+        <p:nvSpPr>
+          <p:cNvPr id="10" name="Oval 9"/>
+          <p:cNvSpPr/>
+          <p:nvPr/>
+        </p:nvSpPr>
+        <p:spPr>
+          <a:xfrm>
+            <a:off x="8811211" y="4726803"/>
+            <a:ext cx="554462" cy="106995"/>
+          </a:xfrm>
+          <a:prstGeom prst="ellipse">
+            <a:avLst/>
+          </a:prstGeom>
+        </p:spPr>
+        <p:style>
+          <a:lnRef idx="2">
+            <a:schemeClr val="dk1">
+              <a:shade val="50000"/>
+            </a:schemeClr>
+          </a:lnRef>
+          <a:fillRef idx="1">
+            <a:schemeClr val="dk1"/>
+          </a:fillRef>
+          <a:effectRef idx="0">
+            <a:schemeClr val="dk1"/>
+          </a:effectRef>
+          <a:fontRef idx="minor">
+            <a:schemeClr val="lt1"/>
+          </a:fontRef>
+        </p:style>
+        <p:txBody>
+          <a:bodyPr rtlCol="0" anchor="ctr"/>
+          <a:lstStyle/>
+          <a:p>
+            <a:pPr algn="ctr"/>
+            <a:endParaRPr lang="en-US"/>
+          </a:p>
+        </p:txBody>
+      </p:sp>
+      <p:sp>
+        <p:nvSpPr>
+          <p:cNvPr id="11" name="Oval 10"/>
+          <p:cNvSpPr/>
+          <p:nvPr/>
+        </p:nvSpPr>
+        <p:spPr>
+          <a:xfrm>
+            <a:off x="9690913" y="4726802"/>
+            <a:ext cx="554462" cy="106995"/>
+          </a:xfrm>
+          <a:prstGeom prst="ellipse">
+            <a:avLst/>
+          </a:prstGeom>
+        </p:spPr>
+        <p:style>
+          <a:lnRef idx="2">
+            <a:schemeClr val="dk1">
+              <a:shade val="50000"/>
+            </a:schemeClr>
+          </a:lnRef>
+          <a:fillRef idx="1">
+            <a:schemeClr val="dk1"/>
+          </a:fillRef>
+          <a:effectRef idx="0">
+            <a:schemeClr val="dk1"/>
+          </a:effectRef>
+          <a:fontRef idx="minor">
+            <a:schemeClr val="lt1"/>
+          </a:fontRef>
+        </p:style>
+        <p:txBody>
+          <a:bodyPr rtlCol="0" anchor="ctr"/>
+          <a:lstStyle/>
+          <a:p>
+            <a:pPr algn="ctr"/>
+            <a:endParaRPr lang="en-US"/>
+          </a:p>
+        </p:txBody>
+      </p:sp>
+      <p:sp>
+        <p:nvSpPr>
+          <p:cNvPr id="12" name="Oval 11"/>
+          <p:cNvSpPr/>
+          <p:nvPr/>
+        </p:nvSpPr>
+        <p:spPr>
+          <a:xfrm>
+            <a:off x="8811211" y="3474748"/>
+            <a:ext cx="554462" cy="106995"/>
+          </a:xfrm>
+          <a:prstGeom prst="ellipse">
+            <a:avLst/>
+          </a:prstGeom>
+        </p:spPr>
+        <p:style>
+          <a:lnRef idx="2">
+            <a:schemeClr val="dk1">
+              <a:shade val="50000"/>
+            </a:schemeClr>
+          </a:lnRef>
+          <a:fillRef idx="1">
+            <a:schemeClr val="dk1"/>
+          </a:fillRef>
+          <a:effectRef idx="0">
+            <a:schemeClr val="dk1"/>
+          </a:effectRef>
+          <a:fontRef idx="minor">
+            <a:schemeClr val="lt1"/>
+          </a:fontRef>
+        </p:style>
+        <p:txBody>
+          <a:bodyPr rtlCol="0" anchor="ctr"/>
+          <a:lstStyle/>
+          <a:p>
+            <a:pPr algn="ctr"/>
+            <a:endParaRPr lang="en-US"/>
+          </a:p>
+        </p:txBody>
+      </p:sp>
+      <p:sp>
+        <p:nvSpPr>
+          <p:cNvPr id="13" name="Oval 12"/>
+          <p:cNvSpPr/>
+          <p:nvPr/>
+        </p:nvSpPr>
+        <p:spPr>
+          <a:xfrm>
+            <a:off x="9704767" y="3474748"/>
+            <a:ext cx="554462" cy="106995"/>
+          </a:xfrm>
+          <a:prstGeom prst="ellipse">
+            <a:avLst/>
+          </a:prstGeom>
+        </p:spPr>
+        <p:style>
+          <a:lnRef idx="2">
+            <a:schemeClr val="dk1">
+              <a:shade val="50000"/>
+            </a:schemeClr>
+          </a:lnRef>
+          <a:fillRef idx="1">
+            <a:schemeClr val="dk1"/>
+          </a:fillRef>
+          <a:effectRef idx="0">
+            <a:schemeClr val="dk1"/>
+          </a:effectRef>
+          <a:fontRef idx="minor">
+            <a:schemeClr val="lt1"/>
+          </a:fontRef>
+        </p:style>
+        <p:txBody>
+          <a:bodyPr rtlCol="0" anchor="ctr"/>
+          <a:lstStyle/>
+          <a:p>
+            <a:pPr algn="ctr"/>
+            <a:endParaRPr lang="en-US"/>
+          </a:p>
+        </p:txBody>
+      </p:sp>
+    </p:spTree>
+    <p:extLst>
+      <p:ext uri="{BB962C8B-B14F-4D97-AF65-F5344CB8AC3E}">
+        <p14:creationId xmlns:p14="http://schemas.microsoft.com/office/powerpoint/2010/main" val="3246801333"/>
       </p:ext>
     </p:extLst>
   </p:cSld>

</xml_diff>